<commit_message>
changed presentation for streamer
</commit_message>
<xml_diff>
--- a/documentation/chiptune_glasba.pptx
+++ b/documentation/chiptune_glasba.pptx
@@ -15,9 +15,10 @@
     <p:sldId id="263" r:id="rId9"/>
     <p:sldId id="264" r:id="rId10"/>
     <p:sldId id="265" r:id="rId11"/>
-    <p:sldId id="266" r:id="rId12"/>
-    <p:sldId id="267" r:id="rId13"/>
-    <p:sldId id="268" r:id="rId14"/>
+    <p:sldId id="269" r:id="rId12"/>
+    <p:sldId id="266" r:id="rId13"/>
+    <p:sldId id="267" r:id="rId14"/>
+    <p:sldId id="268" r:id="rId15"/>
   </p:sldIdLst>
   <p:sldSz cx="9144000" cy="6858000" type="screen4x3"/>
   <p:notesSz cx="6858000" cy="9144000"/>
@@ -2920,7 +2921,7 @@
           <a:p>
             <a:fld id="{64DAAC21-F250-41A1-A60F-336000175B1E}" type="datetimeFigureOut">
               <a:rPr lang="sl-SI" smtClean="0"/>
-              <a:t>26.5.2012</a:t>
+              <a:t>27.5.2012</a:t>
             </a:fld>
             <a:endParaRPr lang="sl-SI"/>
           </a:p>
@@ -3433,7 +3434,7 @@
           <a:p>
             <a:fld id="{64DAAC21-F250-41A1-A60F-336000175B1E}" type="datetimeFigureOut">
               <a:rPr lang="sl-SI" smtClean="0"/>
-              <a:t>26.5.2012</a:t>
+              <a:t>27.5.2012</a:t>
             </a:fld>
             <a:endParaRPr lang="sl-SI"/>
           </a:p>
@@ -3608,7 +3609,7 @@
           <a:p>
             <a:fld id="{64DAAC21-F250-41A1-A60F-336000175B1E}" type="datetimeFigureOut">
               <a:rPr lang="sl-SI" smtClean="0"/>
-              <a:t>26.5.2012</a:t>
+              <a:t>27.5.2012</a:t>
             </a:fld>
             <a:endParaRPr lang="sl-SI"/>
           </a:p>
@@ -3773,7 +3774,7 @@
           <a:p>
             <a:fld id="{64DAAC21-F250-41A1-A60F-336000175B1E}" type="datetimeFigureOut">
               <a:rPr lang="sl-SI" smtClean="0"/>
-              <a:t>26.5.2012</a:t>
+              <a:t>27.5.2012</a:t>
             </a:fld>
             <a:endParaRPr lang="sl-SI"/>
           </a:p>
@@ -6897,7 +6898,7 @@
           <a:p>
             <a:fld id="{64DAAC21-F250-41A1-A60F-336000175B1E}" type="datetimeFigureOut">
               <a:rPr lang="sl-SI" smtClean="0"/>
-              <a:t>26.5.2012</a:t>
+              <a:t>27.5.2012</a:t>
             </a:fld>
             <a:endParaRPr lang="sl-SI"/>
           </a:p>
@@ -7180,7 +7181,7 @@
           <a:p>
             <a:fld id="{64DAAC21-F250-41A1-A60F-336000175B1E}" type="datetimeFigureOut">
               <a:rPr lang="sl-SI" smtClean="0"/>
-              <a:t>26.5.2012</a:t>
+              <a:t>27.5.2012</a:t>
             </a:fld>
             <a:endParaRPr lang="sl-SI"/>
           </a:p>
@@ -7597,7 +7598,7 @@
           <a:p>
             <a:fld id="{64DAAC21-F250-41A1-A60F-336000175B1E}" type="datetimeFigureOut">
               <a:rPr lang="sl-SI" smtClean="0"/>
-              <a:t>26.5.2012</a:t>
+              <a:t>27.5.2012</a:t>
             </a:fld>
             <a:endParaRPr lang="sl-SI"/>
           </a:p>
@@ -7710,7 +7711,7 @@
           <a:p>
             <a:fld id="{64DAAC21-F250-41A1-A60F-336000175B1E}" type="datetimeFigureOut">
               <a:rPr lang="sl-SI" smtClean="0"/>
-              <a:t>26.5.2012</a:t>
+              <a:t>27.5.2012</a:t>
             </a:fld>
             <a:endParaRPr lang="sl-SI"/>
           </a:p>
@@ -7800,7 +7801,7 @@
           <a:p>
             <a:fld id="{64DAAC21-F250-41A1-A60F-336000175B1E}" type="datetimeFigureOut">
               <a:rPr lang="sl-SI" smtClean="0"/>
-              <a:t>26.5.2012</a:t>
+              <a:t>27.5.2012</a:t>
             </a:fld>
             <a:endParaRPr lang="sl-SI"/>
           </a:p>
@@ -7975,7 +7976,7 @@
           <a:p>
             <a:fld id="{64DAAC21-F250-41A1-A60F-336000175B1E}" type="datetimeFigureOut">
               <a:rPr lang="sl-SI" smtClean="0"/>
-              <a:t>26.5.2012</a:t>
+              <a:t>27.5.2012</a:t>
             </a:fld>
             <a:endParaRPr lang="sl-SI"/>
           </a:p>
@@ -8461,7 +8462,7 @@
           <a:p>
             <a:fld id="{64DAAC21-F250-41A1-A60F-336000175B1E}" type="datetimeFigureOut">
               <a:rPr lang="sl-SI" smtClean="0"/>
-              <a:t>26.5.2012</a:t>
+              <a:t>27.5.2012</a:t>
             </a:fld>
             <a:endParaRPr lang="sl-SI"/>
           </a:p>
@@ -9013,7 +9014,7 @@
           <a:p>
             <a:fld id="{64DAAC21-F250-41A1-A60F-336000175B1E}" type="datetimeFigureOut">
               <a:rPr lang="sl-SI" smtClean="0"/>
-              <a:t>26.5.2012</a:t>
+              <a:t>27.5.2012</a:t>
             </a:fld>
             <a:endParaRPr lang="sl-SI"/>
           </a:p>
@@ -9618,93 +9619,66 @@
         <p:spPr/>
         <p:txBody>
           <a:bodyPr>
-            <a:normAutofit lnSpcReduction="10000"/>
+            <a:normAutofit/>
           </a:bodyPr>
           <a:lstStyle/>
           <a:p>
             <a:r>
               <a:rPr lang="sl-SI" dirty="0" smtClean="0"/>
-              <a:t>Paket</a:t>
+              <a:t>Klient</a:t>
             </a:r>
           </a:p>
           <a:p>
             <a:pPr lvl="1"/>
             <a:r>
-              <a:rPr lang="sl-SI" dirty="0" err="1" smtClean="0"/>
-              <a:t>Serializiran</a:t>
-            </a:r>
-            <a:r>
               <a:rPr lang="sl-SI" dirty="0" smtClean="0"/>
-              <a:t> objekt</a:t>
+              <a:t>Zahteva </a:t>
+            </a:r>
+            <a:r>
+              <a:rPr lang="sl-SI" dirty="0"/>
+              <a:t>za priključitev strežniku</a:t>
             </a:r>
           </a:p>
           <a:p>
             <a:pPr lvl="1"/>
             <a:r>
-              <a:rPr lang="sl-SI" dirty="0" smtClean="0"/>
-              <a:t>ID za preverjanje vrstnega reda</a:t>
+              <a:rPr lang="sl-SI" dirty="0"/>
+              <a:t>Prejemanje paketov</a:t>
+            </a:r>
+          </a:p>
+          <a:p>
+            <a:pPr lvl="2"/>
+            <a:r>
+              <a:rPr lang="sl-SI" dirty="0"/>
+              <a:t>Svoja nit</a:t>
+            </a:r>
+          </a:p>
+          <a:p>
+            <a:pPr lvl="2"/>
+            <a:r>
+              <a:rPr lang="sl-SI" dirty="0"/>
+              <a:t>Potrditev formata</a:t>
             </a:r>
           </a:p>
           <a:p>
             <a:pPr lvl="1"/>
             <a:r>
-              <a:rPr lang="sl-SI" dirty="0" smtClean="0"/>
-              <a:t>Razdeljen na zvok in format</a:t>
-            </a:r>
-            <a:endParaRPr lang="sl-SI" dirty="0"/>
-          </a:p>
-          <a:p>
-            <a:r>
-              <a:rPr lang="sl-SI" dirty="0" smtClean="0"/>
-              <a:t>Klient</a:t>
-            </a:r>
-          </a:p>
-          <a:p>
-            <a:pPr lvl="1"/>
-            <a:r>
-              <a:rPr lang="sl-SI" dirty="0" smtClean="0"/>
-              <a:t>Zahteva za priključitev strežniku</a:t>
-            </a:r>
-          </a:p>
-          <a:p>
-            <a:pPr lvl="1"/>
-            <a:r>
-              <a:rPr lang="sl-SI" dirty="0" smtClean="0"/>
-              <a:t>Prejemanje paketov (svoja nit, potrditev formata)</a:t>
-            </a:r>
-          </a:p>
-          <a:p>
-            <a:pPr lvl="1"/>
-            <a:r>
-              <a:rPr lang="sl-SI" dirty="0" smtClean="0"/>
-              <a:t>Obdelava paketa (najprej „najmlajši“, zasičenost)</a:t>
-            </a:r>
-          </a:p>
-          <a:p>
-            <a:r>
-              <a:rPr lang="sl-SI" dirty="0" smtClean="0"/>
-              <a:t>Strežnik</a:t>
-            </a:r>
-          </a:p>
-          <a:p>
-            <a:pPr lvl="1"/>
-            <a:r>
-              <a:rPr lang="sl-SI" dirty="0" smtClean="0"/>
-              <a:t>Dodajanje novih paketov</a:t>
-            </a:r>
-          </a:p>
-          <a:p>
-            <a:pPr lvl="1"/>
-            <a:r>
-              <a:rPr lang="sl-SI" dirty="0" smtClean="0"/>
-              <a:t>Prejemanje s strani klientov (priključitev, format, zasičenost)</a:t>
-            </a:r>
-          </a:p>
-          <a:p>
-            <a:pPr lvl="1"/>
-            <a:r>
-              <a:rPr lang="sl-SI" dirty="0" smtClean="0"/>
-              <a:t>Pošiljanje klientom (format in zvok)</a:t>
+              <a:rPr lang="sl-SI" dirty="0"/>
+              <a:t>Obdelava paketov</a:t>
+            </a:r>
+          </a:p>
+          <a:p>
+            <a:pPr lvl="2"/>
+            <a:r>
+              <a:rPr lang="sl-SI" dirty="0"/>
+              <a:t>Izbiranje naslednjega „najmlajšega“ paketa</a:t>
+            </a:r>
+          </a:p>
+          <a:p>
+            <a:pPr lvl="2"/>
+            <a:r>
+              <a:rPr lang="sl-SI" dirty="0"/>
+              <a:t>Sporočanje zasičenosti</a:t>
             </a:r>
           </a:p>
         </p:txBody>
@@ -9762,6 +9736,167 @@
           <a:lstStyle/>
           <a:p>
             <a:r>
+              <a:rPr lang="sl-SI" smtClean="0"/>
+              <a:t>Tokovnik - </a:t>
+            </a:r>
+            <a:r>
+              <a:rPr lang="sl-SI" dirty="0" smtClean="0"/>
+              <a:t>komponente</a:t>
+            </a:r>
+            <a:endParaRPr lang="sl-SI" dirty="0"/>
+          </a:p>
+        </p:txBody>
+      </p:sp>
+      <p:sp>
+        <p:nvSpPr>
+          <p:cNvPr id="3" name="Content Placeholder 2"/>
+          <p:cNvSpPr>
+            <a:spLocks noGrp="1"/>
+          </p:cNvSpPr>
+          <p:nvPr>
+            <p:ph idx="1"/>
+          </p:nvPr>
+        </p:nvSpPr>
+        <p:spPr/>
+        <p:txBody>
+          <a:bodyPr/>
+          <a:lstStyle/>
+          <a:p>
+            <a:r>
+              <a:rPr lang="sl-SI" dirty="0" smtClean="0"/>
+              <a:t>Strežnik</a:t>
+            </a:r>
+          </a:p>
+          <a:p>
+            <a:pPr lvl="1"/>
+            <a:r>
+              <a:rPr lang="sl-SI" dirty="0" smtClean="0"/>
+              <a:t>Dodajanje </a:t>
+            </a:r>
+            <a:r>
+              <a:rPr lang="sl-SI" dirty="0"/>
+              <a:t>novih paketov</a:t>
+            </a:r>
+          </a:p>
+          <a:p>
+            <a:pPr lvl="2"/>
+            <a:r>
+              <a:rPr lang="sl-SI" dirty="0"/>
+              <a:t>V povezavi s Playlist razredom</a:t>
+            </a:r>
+          </a:p>
+          <a:p>
+            <a:pPr lvl="2"/>
+            <a:r>
+              <a:rPr lang="sl-SI" dirty="0"/>
+              <a:t>S pomočjo AudioInputStream</a:t>
+            </a:r>
+          </a:p>
+          <a:p>
+            <a:pPr lvl="1"/>
+            <a:r>
+              <a:rPr lang="sl-SI" dirty="0"/>
+              <a:t>Prejemanje s strani klientov</a:t>
+            </a:r>
+          </a:p>
+          <a:p>
+            <a:pPr lvl="2"/>
+            <a:r>
+              <a:rPr lang="sl-SI" dirty="0"/>
+              <a:t>Priključitev klienta</a:t>
+            </a:r>
+          </a:p>
+          <a:p>
+            <a:pPr lvl="2"/>
+            <a:r>
+              <a:rPr lang="sl-SI" dirty="0"/>
+              <a:t>Potrjevanje formata</a:t>
+            </a:r>
+          </a:p>
+          <a:p>
+            <a:pPr lvl="2"/>
+            <a:r>
+              <a:rPr lang="sl-SI" dirty="0"/>
+              <a:t>Kontrola </a:t>
+            </a:r>
+            <a:r>
+              <a:rPr lang="sl-SI" dirty="0" smtClean="0"/>
+              <a:t>zasičenosti</a:t>
+            </a:r>
+            <a:endParaRPr lang="sl-SI" dirty="0"/>
+          </a:p>
+          <a:p>
+            <a:pPr lvl="1"/>
+            <a:r>
+              <a:rPr lang="sl-SI" dirty="0"/>
+              <a:t>Pošiljanje klientom</a:t>
+            </a:r>
+          </a:p>
+          <a:p>
+            <a:pPr lvl="2"/>
+            <a:r>
+              <a:rPr lang="sl-SI" dirty="0"/>
+              <a:t>Format</a:t>
+            </a:r>
+          </a:p>
+          <a:p>
+            <a:pPr lvl="2"/>
+            <a:r>
+              <a:rPr lang="sl-SI" dirty="0"/>
+              <a:t>Zvok</a:t>
+            </a:r>
+          </a:p>
+          <a:p>
+            <a:endParaRPr lang="sl-SI" dirty="0"/>
+          </a:p>
+        </p:txBody>
+      </p:sp>
+    </p:spTree>
+    <p:extLst>
+      <p:ext uri="{BB962C8B-B14F-4D97-AF65-F5344CB8AC3E}">
+        <p14:creationId xmlns:p14="http://schemas.microsoft.com/office/powerpoint/2010/main" val="3195258600"/>
+      </p:ext>
+    </p:extLst>
+  </p:cSld>
+  <p:clrMapOvr>
+    <a:masterClrMapping/>
+  </p:clrMapOvr>
+</p:sld>
+</file>
+
+<file path=ppt/slides/slide12.xml><?xml version="1.0" encoding="utf-8"?>
+<p:sld xmlns:a="http://schemas.openxmlformats.org/drawingml/2006/main" xmlns:r="http://schemas.openxmlformats.org/officeDocument/2006/relationships" xmlns:p="http://schemas.openxmlformats.org/presentationml/2006/main">
+  <p:cSld>
+    <p:spTree>
+      <p:nvGrpSpPr>
+        <p:cNvPr id="1" name=""/>
+        <p:cNvGrpSpPr/>
+        <p:nvPr/>
+      </p:nvGrpSpPr>
+      <p:grpSpPr>
+        <a:xfrm>
+          <a:off x="0" y="0"/>
+          <a:ext cx="0" cy="0"/>
+          <a:chOff x="0" y="0"/>
+          <a:chExt cx="0" cy="0"/>
+        </a:xfrm>
+      </p:grpSpPr>
+      <p:sp>
+        <p:nvSpPr>
+          <p:cNvPr id="2" name="Title 1"/>
+          <p:cNvSpPr>
+            <a:spLocks noGrp="1"/>
+          </p:cNvSpPr>
+          <p:nvPr>
+            <p:ph type="title"/>
+          </p:nvPr>
+        </p:nvSpPr>
+        <p:spPr/>
+        <p:txBody>
+          <a:bodyPr/>
+          <a:lstStyle/>
+          <a:p>
+            <a:r>
               <a:rPr lang="sl-SI" dirty="0" smtClean="0"/>
               <a:t>Vizualizacija</a:t>
             </a:r>
@@ -9863,7 +9998,7 @@
 </p:sld>
 </file>
 
-<file path=ppt/slides/slide12.xml><?xml version="1.0" encoding="utf-8"?>
+<file path=ppt/slides/slide13.xml><?xml version="1.0" encoding="utf-8"?>
 <p:sld xmlns:a="http://schemas.openxmlformats.org/drawingml/2006/main" xmlns:r="http://schemas.openxmlformats.org/officeDocument/2006/relationships" xmlns:p="http://schemas.openxmlformats.org/presentationml/2006/main">
   <p:cSld>
     <p:spTree>
@@ -9929,7 +10064,7 @@
 </p:sld>
 </file>
 
-<file path=ppt/slides/slide13.xml><?xml version="1.0" encoding="utf-8"?>
+<file path=ppt/slides/slide14.xml><?xml version="1.0" encoding="utf-8"?>
 <p:sld xmlns:a="http://schemas.openxmlformats.org/drawingml/2006/main" xmlns:r="http://schemas.openxmlformats.org/officeDocument/2006/relationships" xmlns:p="http://schemas.openxmlformats.org/presentationml/2006/main">
   <p:cSld>
     <p:spTree>
@@ -10124,11 +10259,7 @@
           <a:p>
             <a:r>
               <a:rPr lang="sl-SI" dirty="0" smtClean="0"/>
-              <a:t>Posebej </a:t>
-            </a:r>
-            <a:r>
-              <a:rPr lang="sl-SI" dirty="0" smtClean="0"/>
-              <a:t>popularna med spletnimi skupnostmi</a:t>
+              <a:t>Posebej popularna med spletnimi skupnostmi</a:t>
             </a:r>
           </a:p>
           <a:p>
@@ -10916,11 +11047,11 @@
   <p:clrMapOvr>
     <a:masterClrMapping/>
   </p:clrMapOvr>
-  <mc:AlternateContent xmlns:mc="http://schemas.openxmlformats.org/markup-compatibility/2006">
-    <mc:Choice xmlns:p14="http://schemas.microsoft.com/office/powerpoint/2010/main" Requires="p14">
+  <mc:AlternateContent xmlns:mc="http://schemas.openxmlformats.org/markup-compatibility/2006" xmlns:p14="http://schemas.microsoft.com/office/powerpoint/2010/main">
+    <mc:Choice Requires="p14">
       <p:transition spd="slow" p14:dur="2000"/>
     </mc:Choice>
-    <mc:Fallback>
+    <mc:Fallback xmlns="">
       <p:transition spd="slow"/>
     </mc:Fallback>
   </mc:AlternateContent>

</xml_diff>

<commit_message>
Dodan PDF poročila in manjši popravki v prezentaciji
</commit_message>
<xml_diff>
--- a/documentation/chiptune_glasba.pptx
+++ b/documentation/chiptune_glasba.pptx
@@ -10973,17 +10973,25 @@
             </a:r>
             <a:r>
               <a:rPr lang="sl-SI" dirty="0" err="1" smtClean="0"/>
-              <a:t>nekompresiranega</a:t>
+              <a:t>nekomprimiranega</a:t>
             </a:r>
             <a:r>
               <a:rPr lang="sl-SI" dirty="0" smtClean="0"/>
-              <a:t> zvoka</a:t>
-            </a:r>
-          </a:p>
-          <a:p>
+              <a:t> </a:t>
+            </a:r>
             <a:r>
               <a:rPr lang="sl-SI" dirty="0" smtClean="0"/>
-              <a:t>Uporabljam linearno pulzno modulacijo (LPCM)</a:t>
+              <a:t>zvoka</a:t>
+            </a:r>
+          </a:p>
+          <a:p>
+            <a:r>
+              <a:rPr lang="sl-SI" smtClean="0"/>
+              <a:t>Uporablja </a:t>
+            </a:r>
+            <a:r>
+              <a:rPr lang="sl-SI" dirty="0" smtClean="0"/>
+              <a:t>linearno pulzno modulacijo (LPCM)</a:t>
             </a:r>
           </a:p>
           <a:p>

</xml_diff>